<commit_message>
Add Flannel image, update Calico images
</commit_message>
<xml_diff>
--- a/images/theory_analysis/Kubernetes_Calico_Plugin/Kubernetes_Calico_Plugin.pptx
+++ b/images/theory_analysis/Kubernetes_Calico_Plugin/Kubernetes_Calico_Plugin.pptx
@@ -214,7 +214,7 @@
           <a:p>
             <a:fld id="{6CD5550B-26C4-49A9-A5BA-636EF7BE6CE9}" type="datetimeFigureOut">
               <a:rPr lang="ko-KR" altLang="en-US" smtClean="0"/>
-              <a:t>2018-08-22</a:t>
+              <a:t>2018-08-26</a:t>
             </a:fld>
             <a:endParaRPr lang="ko-KR" altLang="en-US"/>
           </a:p>
@@ -828,7 +828,7 @@
           <a:p>
             <a:fld id="{FB30EDBD-1C2D-4C1E-B459-B60219FAB484}" type="datetimeFigureOut">
               <a:rPr lang="ko-KR" altLang="en-US" smtClean="0"/>
-              <a:t>2018-08-22</a:t>
+              <a:t>2018-08-26</a:t>
             </a:fld>
             <a:endParaRPr lang="ko-KR" altLang="en-US"/>
           </a:p>
@@ -991,7 +991,7 @@
           <a:p>
             <a:fld id="{FB30EDBD-1C2D-4C1E-B459-B60219FAB484}" type="datetimeFigureOut">
               <a:rPr lang="ko-KR" altLang="en-US" smtClean="0"/>
-              <a:t>2018-08-22</a:t>
+              <a:t>2018-08-26</a:t>
             </a:fld>
             <a:endParaRPr lang="ko-KR" altLang="en-US"/>
           </a:p>
@@ -1164,7 +1164,7 @@
           <a:p>
             <a:fld id="{FB30EDBD-1C2D-4C1E-B459-B60219FAB484}" type="datetimeFigureOut">
               <a:rPr lang="ko-KR" altLang="en-US" smtClean="0"/>
-              <a:t>2018-08-22</a:t>
+              <a:t>2018-08-26</a:t>
             </a:fld>
             <a:endParaRPr lang="ko-KR" altLang="en-US"/>
           </a:p>
@@ -1327,7 +1327,7 @@
           <a:p>
             <a:fld id="{FB30EDBD-1C2D-4C1E-B459-B60219FAB484}" type="datetimeFigureOut">
               <a:rPr lang="ko-KR" altLang="en-US" smtClean="0"/>
-              <a:t>2018-08-22</a:t>
+              <a:t>2018-08-26</a:t>
             </a:fld>
             <a:endParaRPr lang="ko-KR" altLang="en-US"/>
           </a:p>
@@ -1567,7 +1567,7 @@
           <a:p>
             <a:fld id="{FB30EDBD-1C2D-4C1E-B459-B60219FAB484}" type="datetimeFigureOut">
               <a:rPr lang="ko-KR" altLang="en-US" smtClean="0"/>
-              <a:t>2018-08-22</a:t>
+              <a:t>2018-08-26</a:t>
             </a:fld>
             <a:endParaRPr lang="ko-KR" altLang="en-US"/>
           </a:p>
@@ -1847,7 +1847,7 @@
           <a:p>
             <a:fld id="{FB30EDBD-1C2D-4C1E-B459-B60219FAB484}" type="datetimeFigureOut">
               <a:rPr lang="ko-KR" altLang="en-US" smtClean="0"/>
-              <a:t>2018-08-22</a:t>
+              <a:t>2018-08-26</a:t>
             </a:fld>
             <a:endParaRPr lang="ko-KR" altLang="en-US"/>
           </a:p>
@@ -2261,7 +2261,7 @@
           <a:p>
             <a:fld id="{FB30EDBD-1C2D-4C1E-B459-B60219FAB484}" type="datetimeFigureOut">
               <a:rPr lang="ko-KR" altLang="en-US" smtClean="0"/>
-              <a:t>2018-08-22</a:t>
+              <a:t>2018-08-26</a:t>
             </a:fld>
             <a:endParaRPr lang="ko-KR" altLang="en-US"/>
           </a:p>
@@ -2373,7 +2373,7 @@
           <a:p>
             <a:fld id="{FB30EDBD-1C2D-4C1E-B459-B60219FAB484}" type="datetimeFigureOut">
               <a:rPr lang="ko-KR" altLang="en-US" smtClean="0"/>
-              <a:t>2018-08-22</a:t>
+              <a:t>2018-08-26</a:t>
             </a:fld>
             <a:endParaRPr lang="ko-KR" altLang="en-US"/>
           </a:p>
@@ -2463,7 +2463,7 @@
           <a:p>
             <a:fld id="{FB30EDBD-1C2D-4C1E-B459-B60219FAB484}" type="datetimeFigureOut">
               <a:rPr lang="ko-KR" altLang="en-US" smtClean="0"/>
-              <a:t>2018-08-22</a:t>
+              <a:t>2018-08-26</a:t>
             </a:fld>
             <a:endParaRPr lang="ko-KR" altLang="en-US"/>
           </a:p>
@@ -2733,7 +2733,7 @@
           <a:p>
             <a:fld id="{FB30EDBD-1C2D-4C1E-B459-B60219FAB484}" type="datetimeFigureOut">
               <a:rPr lang="ko-KR" altLang="en-US" smtClean="0"/>
-              <a:t>2018-08-22</a:t>
+              <a:t>2018-08-26</a:t>
             </a:fld>
             <a:endParaRPr lang="ko-KR" altLang="en-US"/>
           </a:p>
@@ -2980,7 +2980,7 @@
           <a:p>
             <a:fld id="{FB30EDBD-1C2D-4C1E-B459-B60219FAB484}" type="datetimeFigureOut">
               <a:rPr lang="ko-KR" altLang="en-US" smtClean="0"/>
-              <a:t>2018-08-22</a:t>
+              <a:t>2018-08-26</a:t>
             </a:fld>
             <a:endParaRPr lang="ko-KR" altLang="en-US"/>
           </a:p>
@@ -3186,7 +3186,7 @@
           <a:p>
             <a:fld id="{FB30EDBD-1C2D-4C1E-B459-B60219FAB484}" type="datetimeFigureOut">
               <a:rPr lang="ko-KR" altLang="en-US" smtClean="0"/>
-              <a:t>2018-08-22</a:t>
+              <a:t>2018-08-26</a:t>
             </a:fld>
             <a:endParaRPr lang="ko-KR" altLang="en-US"/>
           </a:p>
@@ -4452,14 +4452,14 @@
           <p:nvPr>
             <p:extLst>
               <p:ext uri="{D42A27DB-BD31-4B8C-83A1-F6EECF244321}">
-                <p14:modId xmlns:p14="http://schemas.microsoft.com/office/powerpoint/2010/main" val="1386017289"/>
+                <p14:modId xmlns:p14="http://schemas.microsoft.com/office/powerpoint/2010/main" val="3299842159"/>
               </p:ext>
             </p:extLst>
           </p:nvPr>
         </p:nvGraphicFramePr>
         <p:xfrm>
-          <a:off x="899592" y="2355726"/>
-          <a:ext cx="3024336" cy="1112520"/>
+          <a:off x="783596" y="2355726"/>
+          <a:ext cx="3256329" cy="1112520"/>
         </p:xfrm>
         <a:graphic>
           <a:graphicData uri="http://schemas.openxmlformats.org/drawingml/2006/table">
@@ -4468,14 +4468,21 @@
                 <a:tableStyleId>{2D5ABB26-0587-4C30-8999-92F81FD0307C}</a:tableStyleId>
               </a:tblPr>
               <a:tblGrid>
-                <a:gridCol w="1656184">
+                <a:gridCol w="1556156">
                   <a:extLst>
                     <a:ext uri="{9D8B030D-6E8A-4147-A177-3AD203B41FA5}">
                       <a16:colId xmlns:a16="http://schemas.microsoft.com/office/drawing/2014/main" val="20000"/>
                     </a:ext>
                   </a:extLst>
                 </a:gridCol>
-                <a:gridCol w="1368152">
+                <a:gridCol w="936104">
+                  <a:extLst>
+                    <a:ext uri="{9D8B030D-6E8A-4147-A177-3AD203B41FA5}">
+                      <a16:colId xmlns:a16="http://schemas.microsoft.com/office/drawing/2014/main" val="2132610268"/>
+                    </a:ext>
+                  </a:extLst>
+                </a:gridCol>
+                <a:gridCol w="764069">
                   <a:extLst>
                     <a:ext uri="{9D8B030D-6E8A-4147-A177-3AD203B41FA5}">
                       <a16:colId xmlns:a16="http://schemas.microsoft.com/office/drawing/2014/main" val="20001"/>
@@ -4497,7 +4504,59 @@
                       <a:endParaRPr lang="ko-KR" altLang="en-US" sz="1400" dirty="0"/>
                     </a:p>
                   </a:txBody>
-                  <a:tcPr>
+                  <a:tcPr anchor="ctr">
+                    <a:lnL w="19050" cap="flat" cmpd="sng" algn="ctr">
+                      <a:solidFill>
+                        <a:schemeClr val="tx1"/>
+                      </a:solidFill>
+                      <a:prstDash val="solid"/>
+                      <a:round/>
+                      <a:headEnd type="none" w="med" len="med"/>
+                      <a:tailEnd type="none" w="med" len="med"/>
+                    </a:lnL>
+                    <a:lnR w="19050" cap="flat" cmpd="sng" algn="ctr">
+                      <a:solidFill>
+                        <a:schemeClr val="tx1"/>
+                      </a:solidFill>
+                      <a:prstDash val="solid"/>
+                      <a:round/>
+                      <a:headEnd type="none" w="med" len="med"/>
+                      <a:tailEnd type="none" w="med" len="med"/>
+                    </a:lnR>
+                    <a:lnT w="19050" cap="flat" cmpd="sng" algn="ctr">
+                      <a:solidFill>
+                        <a:schemeClr val="tx1"/>
+                      </a:solidFill>
+                      <a:prstDash val="solid"/>
+                      <a:round/>
+                      <a:headEnd type="none" w="med" len="med"/>
+                      <a:tailEnd type="none" w="med" len="med"/>
+                    </a:lnT>
+                    <a:lnB w="19050" cap="flat" cmpd="sng" algn="ctr">
+                      <a:solidFill>
+                        <a:schemeClr val="tx1"/>
+                      </a:solidFill>
+                      <a:prstDash val="solid"/>
+                      <a:round/>
+                      <a:headEnd type="none" w="med" len="med"/>
+                      <a:tailEnd type="none" w="med" len="med"/>
+                    </a:lnB>
+                  </a:tcPr>
+                </a:tc>
+                <a:tc>
+                  <a:txBody>
+                    <a:bodyPr/>
+                    <a:lstStyle/>
+                    <a:p>
+                      <a:pPr latinLnBrk="1"/>
+                      <a:r>
+                        <a:rPr lang="en-US" altLang="ko-KR" sz="1400"/>
+                        <a:t>0.0.0.0</a:t>
+                      </a:r>
+                      <a:endParaRPr lang="ko-KR" altLang="en-US" sz="1400" dirty="0"/>
+                    </a:p>
+                  </a:txBody>
+                  <a:tcPr anchor="ctr">
                     <a:lnL w="19050" cap="flat" cmpd="sng" algn="ctr">
                       <a:solidFill>
                         <a:schemeClr val="tx1"/>
@@ -4549,7 +4608,7 @@
                       <a:endParaRPr lang="ko-KR" altLang="en-US" sz="1400" dirty="0"/>
                     </a:p>
                   </a:txBody>
-                  <a:tcPr>
+                  <a:tcPr anchor="ctr">
                     <a:lnL w="19050" cap="flat" cmpd="sng" algn="ctr">
                       <a:solidFill>
                         <a:schemeClr val="tx1"/>
@@ -4608,7 +4667,59 @@
                       <a:endParaRPr lang="ko-KR" altLang="en-US" sz="1400" dirty="0"/>
                     </a:p>
                   </a:txBody>
-                  <a:tcPr>
+                  <a:tcPr anchor="ctr">
+                    <a:lnL w="19050" cap="flat" cmpd="sng" algn="ctr">
+                      <a:solidFill>
+                        <a:schemeClr val="tx1"/>
+                      </a:solidFill>
+                      <a:prstDash val="solid"/>
+                      <a:round/>
+                      <a:headEnd type="none" w="med" len="med"/>
+                      <a:tailEnd type="none" w="med" len="med"/>
+                    </a:lnL>
+                    <a:lnR w="19050" cap="flat" cmpd="sng" algn="ctr">
+                      <a:solidFill>
+                        <a:schemeClr val="tx1"/>
+                      </a:solidFill>
+                      <a:prstDash val="solid"/>
+                      <a:round/>
+                      <a:headEnd type="none" w="med" len="med"/>
+                      <a:tailEnd type="none" w="med" len="med"/>
+                    </a:lnR>
+                    <a:lnT w="19050" cap="flat" cmpd="sng" algn="ctr">
+                      <a:solidFill>
+                        <a:schemeClr val="tx1"/>
+                      </a:solidFill>
+                      <a:prstDash val="solid"/>
+                      <a:round/>
+                      <a:headEnd type="none" w="med" len="med"/>
+                      <a:tailEnd type="none" w="med" len="med"/>
+                    </a:lnT>
+                    <a:lnB w="19050" cap="flat" cmpd="sng" algn="ctr">
+                      <a:solidFill>
+                        <a:schemeClr val="tx1"/>
+                      </a:solidFill>
+                      <a:prstDash val="solid"/>
+                      <a:round/>
+                      <a:headEnd type="none" w="med" len="med"/>
+                      <a:tailEnd type="none" w="med" len="med"/>
+                    </a:lnB>
+                  </a:tcPr>
+                </a:tc>
+                <a:tc>
+                  <a:txBody>
+                    <a:bodyPr/>
+                    <a:lstStyle/>
+                    <a:p>
+                      <a:pPr latinLnBrk="1"/>
+                      <a:r>
+                        <a:rPr lang="en-US" altLang="ko-KR" sz="1400"/>
+                        <a:t>0.0.0.0</a:t>
+                      </a:r>
+                      <a:endParaRPr lang="ko-KR" altLang="en-US" sz="1400" dirty="0"/>
+                    </a:p>
+                  </a:txBody>
+                  <a:tcPr anchor="ctr">
                     <a:lnL w="19050" cap="flat" cmpd="sng" algn="ctr">
                       <a:solidFill>
                         <a:schemeClr val="tx1"/>
@@ -4660,7 +4771,7 @@
                       <a:endParaRPr lang="ko-KR" altLang="en-US" sz="1400" dirty="0"/>
                     </a:p>
                   </a:txBody>
-                  <a:tcPr>
+                  <a:tcPr anchor="ctr">
                     <a:lnL w="19050" cap="flat" cmpd="sng" algn="ctr">
                       <a:solidFill>
                         <a:schemeClr val="tx1"/>
@@ -4719,7 +4830,59 @@
                       <a:endParaRPr lang="ko-KR" altLang="en-US" sz="1400" dirty="0"/>
                     </a:p>
                   </a:txBody>
-                  <a:tcPr>
+                  <a:tcPr anchor="ctr">
+                    <a:lnL w="19050" cap="flat" cmpd="sng" algn="ctr">
+                      <a:solidFill>
+                        <a:schemeClr val="tx1"/>
+                      </a:solidFill>
+                      <a:prstDash val="solid"/>
+                      <a:round/>
+                      <a:headEnd type="none" w="med" len="med"/>
+                      <a:tailEnd type="none" w="med" len="med"/>
+                    </a:lnL>
+                    <a:lnR w="19050" cap="flat" cmpd="sng" algn="ctr">
+                      <a:solidFill>
+                        <a:schemeClr val="tx1"/>
+                      </a:solidFill>
+                      <a:prstDash val="solid"/>
+                      <a:round/>
+                      <a:headEnd type="none" w="med" len="med"/>
+                      <a:tailEnd type="none" w="med" len="med"/>
+                    </a:lnR>
+                    <a:lnT w="19050" cap="flat" cmpd="sng" algn="ctr">
+                      <a:solidFill>
+                        <a:schemeClr val="tx1"/>
+                      </a:solidFill>
+                      <a:prstDash val="solid"/>
+                      <a:round/>
+                      <a:headEnd type="none" w="med" len="med"/>
+                      <a:tailEnd type="none" w="med" len="med"/>
+                    </a:lnT>
+                    <a:lnB w="19050" cap="flat" cmpd="sng" algn="ctr">
+                      <a:solidFill>
+                        <a:schemeClr val="tx1"/>
+                      </a:solidFill>
+                      <a:prstDash val="solid"/>
+                      <a:round/>
+                      <a:headEnd type="none" w="med" len="med"/>
+                      <a:tailEnd type="none" w="med" len="med"/>
+                    </a:lnB>
+                  </a:tcPr>
+                </a:tc>
+                <a:tc>
+                  <a:txBody>
+                    <a:bodyPr/>
+                    <a:lstStyle/>
+                    <a:p>
+                      <a:pPr latinLnBrk="1"/>
+                      <a:r>
+                        <a:rPr lang="en-US" altLang="ko-KR" sz="1400"/>
+                        <a:t>0.0.0.0</a:t>
+                      </a:r>
+                      <a:endParaRPr lang="ko-KR" altLang="en-US" sz="1400" dirty="0"/>
+                    </a:p>
+                  </a:txBody>
+                  <a:tcPr anchor="ctr">
                     <a:lnL w="19050" cap="flat" cmpd="sng" algn="ctr">
                       <a:solidFill>
                         <a:schemeClr val="tx1"/>
@@ -4771,7 +4934,7 @@
                       <a:endParaRPr lang="ko-KR" altLang="en-US" sz="1400" dirty="0"/>
                     </a:p>
                   </a:txBody>
-                  <a:tcPr>
+                  <a:tcPr anchor="ctr">
                     <a:lnL w="19050" cap="flat" cmpd="sng" algn="ctr">
                       <a:solidFill>
                         <a:schemeClr val="tx1"/>
@@ -5183,14 +5346,14 @@
           <p:nvPr>
             <p:extLst>
               <p:ext uri="{D42A27DB-BD31-4B8C-83A1-F6EECF244321}">
-                <p14:modId xmlns:p14="http://schemas.microsoft.com/office/powerpoint/2010/main" val="4087282477"/>
+                <p14:modId xmlns:p14="http://schemas.microsoft.com/office/powerpoint/2010/main" val="3346343956"/>
               </p:ext>
             </p:extLst>
           </p:nvPr>
         </p:nvGraphicFramePr>
         <p:xfrm>
-          <a:off x="5220072" y="2355726"/>
-          <a:ext cx="3024336" cy="1112520"/>
+          <a:off x="5104076" y="2355726"/>
+          <a:ext cx="3256329" cy="1112520"/>
         </p:xfrm>
         <a:graphic>
           <a:graphicData uri="http://schemas.openxmlformats.org/drawingml/2006/table">
@@ -5199,14 +5362,21 @@
                 <a:tableStyleId>{2D5ABB26-0587-4C30-8999-92F81FD0307C}</a:tableStyleId>
               </a:tblPr>
               <a:tblGrid>
-                <a:gridCol w="1656184">
+                <a:gridCol w="1556156">
                   <a:extLst>
                     <a:ext uri="{9D8B030D-6E8A-4147-A177-3AD203B41FA5}">
                       <a16:colId xmlns:a16="http://schemas.microsoft.com/office/drawing/2014/main" val="20000"/>
                     </a:ext>
                   </a:extLst>
                 </a:gridCol>
-                <a:gridCol w="1368152">
+                <a:gridCol w="936104">
+                  <a:extLst>
+                    <a:ext uri="{9D8B030D-6E8A-4147-A177-3AD203B41FA5}">
+                      <a16:colId xmlns:a16="http://schemas.microsoft.com/office/drawing/2014/main" val="2983524949"/>
+                    </a:ext>
+                  </a:extLst>
+                </a:gridCol>
+                <a:gridCol w="764069">
                   <a:extLst>
                     <a:ext uri="{9D8B030D-6E8A-4147-A177-3AD203B41FA5}">
                       <a16:colId xmlns:a16="http://schemas.microsoft.com/office/drawing/2014/main" val="20001"/>
@@ -5228,7 +5398,59 @@
                       <a:endParaRPr lang="ko-KR" altLang="en-US" sz="1400" dirty="0"/>
                     </a:p>
                   </a:txBody>
-                  <a:tcPr>
+                  <a:tcPr anchor="ctr">
+                    <a:lnL w="19050" cap="flat" cmpd="sng" algn="ctr">
+                      <a:solidFill>
+                        <a:schemeClr val="tx1"/>
+                      </a:solidFill>
+                      <a:prstDash val="solid"/>
+                      <a:round/>
+                      <a:headEnd type="none" w="med" len="med"/>
+                      <a:tailEnd type="none" w="med" len="med"/>
+                    </a:lnL>
+                    <a:lnR w="19050" cap="flat" cmpd="sng" algn="ctr">
+                      <a:solidFill>
+                        <a:schemeClr val="tx1"/>
+                      </a:solidFill>
+                      <a:prstDash val="solid"/>
+                      <a:round/>
+                      <a:headEnd type="none" w="med" len="med"/>
+                      <a:tailEnd type="none" w="med" len="med"/>
+                    </a:lnR>
+                    <a:lnT w="19050" cap="flat" cmpd="sng" algn="ctr">
+                      <a:solidFill>
+                        <a:schemeClr val="tx1"/>
+                      </a:solidFill>
+                      <a:prstDash val="solid"/>
+                      <a:round/>
+                      <a:headEnd type="none" w="med" len="med"/>
+                      <a:tailEnd type="none" w="med" len="med"/>
+                    </a:lnT>
+                    <a:lnB w="19050" cap="flat" cmpd="sng" algn="ctr">
+                      <a:solidFill>
+                        <a:schemeClr val="tx1"/>
+                      </a:solidFill>
+                      <a:prstDash val="solid"/>
+                      <a:round/>
+                      <a:headEnd type="none" w="med" len="med"/>
+                      <a:tailEnd type="none" w="med" len="med"/>
+                    </a:lnB>
+                  </a:tcPr>
+                </a:tc>
+                <a:tc>
+                  <a:txBody>
+                    <a:bodyPr/>
+                    <a:lstStyle/>
+                    <a:p>
+                      <a:pPr latinLnBrk="1"/>
+                      <a:r>
+                        <a:rPr lang="en-US" altLang="ko-KR" sz="1400"/>
+                        <a:t>0.0.0.0</a:t>
+                      </a:r>
+                      <a:endParaRPr lang="ko-KR" altLang="en-US" sz="1400" dirty="0"/>
+                    </a:p>
+                  </a:txBody>
+                  <a:tcPr anchor="ctr">
                     <a:lnL w="19050" cap="flat" cmpd="sng" algn="ctr">
                       <a:solidFill>
                         <a:schemeClr val="tx1"/>
@@ -5280,7 +5502,7 @@
                       <a:endParaRPr lang="ko-KR" altLang="en-US" sz="1400" dirty="0"/>
                     </a:p>
                   </a:txBody>
-                  <a:tcPr>
+                  <a:tcPr anchor="ctr">
                     <a:lnL w="19050" cap="flat" cmpd="sng" algn="ctr">
                       <a:solidFill>
                         <a:schemeClr val="tx1"/>
@@ -5339,7 +5561,59 @@
                       <a:endParaRPr lang="ko-KR" altLang="en-US" sz="1400" dirty="0"/>
                     </a:p>
                   </a:txBody>
-                  <a:tcPr>
+                  <a:tcPr anchor="ctr">
+                    <a:lnL w="19050" cap="flat" cmpd="sng" algn="ctr">
+                      <a:solidFill>
+                        <a:schemeClr val="tx1"/>
+                      </a:solidFill>
+                      <a:prstDash val="solid"/>
+                      <a:round/>
+                      <a:headEnd type="none" w="med" len="med"/>
+                      <a:tailEnd type="none" w="med" len="med"/>
+                    </a:lnL>
+                    <a:lnR w="19050" cap="flat" cmpd="sng" algn="ctr">
+                      <a:solidFill>
+                        <a:schemeClr val="tx1"/>
+                      </a:solidFill>
+                      <a:prstDash val="solid"/>
+                      <a:round/>
+                      <a:headEnd type="none" w="med" len="med"/>
+                      <a:tailEnd type="none" w="med" len="med"/>
+                    </a:lnR>
+                    <a:lnT w="19050" cap="flat" cmpd="sng" algn="ctr">
+                      <a:solidFill>
+                        <a:schemeClr val="tx1"/>
+                      </a:solidFill>
+                      <a:prstDash val="solid"/>
+                      <a:round/>
+                      <a:headEnd type="none" w="med" len="med"/>
+                      <a:tailEnd type="none" w="med" len="med"/>
+                    </a:lnT>
+                    <a:lnB w="19050" cap="flat" cmpd="sng" algn="ctr">
+                      <a:solidFill>
+                        <a:schemeClr val="tx1"/>
+                      </a:solidFill>
+                      <a:prstDash val="solid"/>
+                      <a:round/>
+                      <a:headEnd type="none" w="med" len="med"/>
+                      <a:tailEnd type="none" w="med" len="med"/>
+                    </a:lnB>
+                  </a:tcPr>
+                </a:tc>
+                <a:tc>
+                  <a:txBody>
+                    <a:bodyPr/>
+                    <a:lstStyle/>
+                    <a:p>
+                      <a:pPr latinLnBrk="1"/>
+                      <a:r>
+                        <a:rPr lang="en-US" altLang="ko-KR" sz="1400"/>
+                        <a:t>0.0.0.0</a:t>
+                      </a:r>
+                      <a:endParaRPr lang="ko-KR" altLang="en-US" sz="1400" dirty="0"/>
+                    </a:p>
+                  </a:txBody>
+                  <a:tcPr anchor="ctr">
                     <a:lnL w="19050" cap="flat" cmpd="sng" algn="ctr">
                       <a:solidFill>
                         <a:schemeClr val="tx1"/>
@@ -5391,7 +5665,7 @@
                       <a:endParaRPr lang="ko-KR" altLang="en-US" sz="1400" dirty="0"/>
                     </a:p>
                   </a:txBody>
-                  <a:tcPr>
+                  <a:tcPr anchor="ctr">
                     <a:lnL w="19050" cap="flat" cmpd="sng" algn="ctr">
                       <a:solidFill>
                         <a:schemeClr val="tx1"/>
@@ -5450,7 +5724,59 @@
                       <a:endParaRPr lang="ko-KR" altLang="en-US" sz="1400" dirty="0"/>
                     </a:p>
                   </a:txBody>
-                  <a:tcPr>
+                  <a:tcPr anchor="ctr">
+                    <a:lnL w="19050" cap="flat" cmpd="sng" algn="ctr">
+                      <a:solidFill>
+                        <a:schemeClr val="tx1"/>
+                      </a:solidFill>
+                      <a:prstDash val="solid"/>
+                      <a:round/>
+                      <a:headEnd type="none" w="med" len="med"/>
+                      <a:tailEnd type="none" w="med" len="med"/>
+                    </a:lnL>
+                    <a:lnR w="19050" cap="flat" cmpd="sng" algn="ctr">
+                      <a:solidFill>
+                        <a:schemeClr val="tx1"/>
+                      </a:solidFill>
+                      <a:prstDash val="solid"/>
+                      <a:round/>
+                      <a:headEnd type="none" w="med" len="med"/>
+                      <a:tailEnd type="none" w="med" len="med"/>
+                    </a:lnR>
+                    <a:lnT w="19050" cap="flat" cmpd="sng" algn="ctr">
+                      <a:solidFill>
+                        <a:schemeClr val="tx1"/>
+                      </a:solidFill>
+                      <a:prstDash val="solid"/>
+                      <a:round/>
+                      <a:headEnd type="none" w="med" len="med"/>
+                      <a:tailEnd type="none" w="med" len="med"/>
+                    </a:lnT>
+                    <a:lnB w="19050" cap="flat" cmpd="sng" algn="ctr">
+                      <a:solidFill>
+                        <a:schemeClr val="tx1"/>
+                      </a:solidFill>
+                      <a:prstDash val="solid"/>
+                      <a:round/>
+                      <a:headEnd type="none" w="med" len="med"/>
+                      <a:tailEnd type="none" w="med" len="med"/>
+                    </a:lnB>
+                  </a:tcPr>
+                </a:tc>
+                <a:tc>
+                  <a:txBody>
+                    <a:bodyPr/>
+                    <a:lstStyle/>
+                    <a:p>
+                      <a:pPr latinLnBrk="1"/>
+                      <a:r>
+                        <a:rPr lang="en-US" altLang="ko-KR" sz="1400"/>
+                        <a:t>0.0.0.0</a:t>
+                      </a:r>
+                      <a:endParaRPr lang="ko-KR" altLang="en-US" sz="1400" dirty="0"/>
+                    </a:p>
+                  </a:txBody>
+                  <a:tcPr anchor="ctr">
                     <a:lnL w="19050" cap="flat" cmpd="sng" algn="ctr">
                       <a:solidFill>
                         <a:schemeClr val="tx1"/>
@@ -5502,7 +5828,7 @@
                       <a:endParaRPr lang="ko-KR" altLang="en-US" sz="1400" dirty="0"/>
                     </a:p>
                   </a:txBody>
-                  <a:tcPr>
+                  <a:tcPr anchor="ctr">
                     <a:lnL w="19050" cap="flat" cmpd="sng" algn="ctr">
                       <a:solidFill>
                         <a:schemeClr val="tx1"/>

</xml_diff>